<commit_message>
Add slides with more info about workers/executors and a slide on execution flow.
</commit_message>
<xml_diff>
--- a/presentation/How To Not Fail At Storm.pptx
+++ b/presentation/How To Not Fail At Storm.pptx
@@ -5,7 +5,7 @@
     <p:sldMasterId id="2147483660" r:id="rId1"/>
   </p:sldMasterIdLst>
   <p:notesMasterIdLst>
-    <p:notesMasterId r:id="rId16"/>
+    <p:notesMasterId r:id="rId18"/>
   </p:notesMasterIdLst>
   <p:sldIdLst>
     <p:sldId id="256" r:id="rId2"/>
@@ -14,14 +14,16 @@
     <p:sldId id="268" r:id="rId5"/>
     <p:sldId id="265" r:id="rId6"/>
     <p:sldId id="274" r:id="rId7"/>
-    <p:sldId id="267" r:id="rId8"/>
-    <p:sldId id="273" r:id="rId9"/>
-    <p:sldId id="269" r:id="rId10"/>
-    <p:sldId id="271" r:id="rId11"/>
-    <p:sldId id="270" r:id="rId12"/>
-    <p:sldId id="261" r:id="rId13"/>
-    <p:sldId id="272" r:id="rId14"/>
-    <p:sldId id="262" r:id="rId15"/>
+    <p:sldId id="276" r:id="rId8"/>
+    <p:sldId id="267" r:id="rId9"/>
+    <p:sldId id="275" r:id="rId10"/>
+    <p:sldId id="273" r:id="rId11"/>
+    <p:sldId id="269" r:id="rId12"/>
+    <p:sldId id="271" r:id="rId13"/>
+    <p:sldId id="270" r:id="rId14"/>
+    <p:sldId id="261" r:id="rId15"/>
+    <p:sldId id="272" r:id="rId16"/>
+    <p:sldId id="262" r:id="rId17"/>
   </p:sldIdLst>
   <p:sldSz cx="9144000" cy="6858000" type="screen4x3"/>
   <p:notesSz cx="6858000" cy="9144000"/>
@@ -279,7 +281,7 @@
               <a:pPr>
                 <a:defRPr/>
               </a:pPr>
-              <a:t>10/9/2017</a:t>
+              <a:t>10/12/2017</a:t>
             </a:fld>
             <a:endParaRPr lang="en-US"/>
           </a:p>
@@ -1486,7 +1488,7 @@
             <a:fld id="{20E8DAB8-E579-4814-9D86-94162270BB10}" type="slidenum">
               <a:rPr lang="en-US" altLang="en-US" smtClean="0"/>
               <a:pPr/>
-              <a:t>7</a:t>
+              <a:t>8</a:t>
             </a:fld>
             <a:endParaRPr lang="en-US" altLang="en-US"/>
           </a:p>
@@ -1778,7 +1780,7 @@
             <a:fld id="{89B37A25-B6CC-4A88-B641-72090254E773}" type="slidenum">
               <a:rPr lang="en-US" altLang="en-US" smtClean="0"/>
               <a:pPr/>
-              <a:t>9</a:t>
+              <a:t>11</a:t>
             </a:fld>
             <a:endParaRPr lang="en-US" altLang="en-US"/>
           </a:p>
@@ -2059,7 +2061,7 @@
             <a:fld id="{63E834E1-987D-43DF-9583-A40EA2CBB942}" type="slidenum">
               <a:rPr lang="en-US" altLang="en-US" smtClean="0"/>
               <a:pPr/>
-              <a:t>11</a:t>
+              <a:t>13</a:t>
             </a:fld>
             <a:endParaRPr lang="en-US" altLang="en-US"/>
           </a:p>
@@ -2388,7 +2390,7 @@
             <a:fld id="{30424D31-C86E-40E7-A692-6955DF04DC9F}" type="slidenum">
               <a:rPr lang="en-US" altLang="en-US" smtClean="0"/>
               <a:pPr/>
-              <a:t>12</a:t>
+              <a:t>14</a:t>
             </a:fld>
             <a:endParaRPr lang="en-US" altLang="en-US"/>
           </a:p>
@@ -2835,7 +2837,7 @@
               <a:pPr>
                 <a:defRPr/>
               </a:pPr>
-              <a:t>10/9/2017</a:t>
+              <a:t>10/12/2017</a:t>
             </a:fld>
             <a:endParaRPr lang="en-US"/>
           </a:p>
@@ -3147,7 +3149,7 @@
               <a:pPr>
                 <a:defRPr/>
               </a:pPr>
-              <a:t>10/9/2017</a:t>
+              <a:t>10/12/2017</a:t>
             </a:fld>
             <a:endParaRPr lang="en-US"/>
           </a:p>
@@ -3440,7 +3442,7 @@
               <a:pPr>
                 <a:defRPr/>
               </a:pPr>
-              <a:t>10/9/2017</a:t>
+              <a:t>10/12/2017</a:t>
             </a:fld>
             <a:endParaRPr lang="en-US"/>
           </a:p>
@@ -4123,7 +4125,7 @@
               <a:pPr>
                 <a:defRPr/>
               </a:pPr>
-              <a:t>10/9/2017</a:t>
+              <a:t>10/12/2017</a:t>
             </a:fld>
             <a:endParaRPr lang="en-US"/>
           </a:p>
@@ -4416,7 +4418,7 @@
               <a:pPr>
                 <a:defRPr/>
               </a:pPr>
-              <a:t>10/9/2017</a:t>
+              <a:t>10/12/2017</a:t>
             </a:fld>
             <a:endParaRPr lang="en-US"/>
           </a:p>
@@ -5088,7 +5090,7 @@
               <a:pPr>
                 <a:defRPr/>
               </a:pPr>
-              <a:t>10/9/2017</a:t>
+              <a:t>10/12/2017</a:t>
             </a:fld>
             <a:endParaRPr lang="en-US"/>
           </a:p>
@@ -5425,7 +5427,7 @@
               <a:pPr>
                 <a:defRPr/>
               </a:pPr>
-              <a:t>10/9/2017</a:t>
+              <a:t>10/12/2017</a:t>
             </a:fld>
             <a:endParaRPr lang="en-US"/>
           </a:p>
@@ -5654,7 +5656,7 @@
               <a:pPr>
                 <a:defRPr/>
               </a:pPr>
-              <a:t>10/9/2017</a:t>
+              <a:t>10/12/2017</a:t>
             </a:fld>
             <a:endParaRPr lang="en-US"/>
           </a:p>
@@ -5883,7 +5885,7 @@
               <a:pPr>
                 <a:defRPr/>
               </a:pPr>
-              <a:t>10/9/2017</a:t>
+              <a:t>10/12/2017</a:t>
             </a:fld>
             <a:endParaRPr lang="en-US"/>
           </a:p>
@@ -6108,7 +6110,7 @@
               <a:pPr>
                 <a:defRPr/>
               </a:pPr>
-              <a:t>10/9/2017</a:t>
+              <a:t>10/12/2017</a:t>
             </a:fld>
             <a:endParaRPr lang="en-US"/>
           </a:p>
@@ -6401,7 +6403,7 @@
               <a:pPr>
                 <a:defRPr/>
               </a:pPr>
-              <a:t>10/9/2017</a:t>
+              <a:t>10/12/2017</a:t>
             </a:fld>
             <a:endParaRPr lang="en-US"/>
           </a:p>
@@ -6691,7 +6693,7 @@
               <a:pPr>
                 <a:defRPr/>
               </a:pPr>
-              <a:t>10/9/2017</a:t>
+              <a:t>10/12/2017</a:t>
             </a:fld>
             <a:endParaRPr lang="en-US"/>
           </a:p>
@@ -7123,7 +7125,7 @@
               <a:pPr>
                 <a:defRPr/>
               </a:pPr>
-              <a:t>10/9/2017</a:t>
+              <a:t>10/12/2017</a:t>
             </a:fld>
             <a:endParaRPr lang="en-US"/>
           </a:p>
@@ -7295,7 +7297,7 @@
               <a:pPr>
                 <a:defRPr/>
               </a:pPr>
-              <a:t>10/9/2017</a:t>
+              <a:t>10/12/2017</a:t>
             </a:fld>
             <a:endParaRPr lang="en-US"/>
           </a:p>
@@ -7435,7 +7437,7 @@
               <a:pPr>
                 <a:defRPr/>
               </a:pPr>
-              <a:t>10/9/2017</a:t>
+              <a:t>10/12/2017</a:t>
             </a:fld>
             <a:endParaRPr lang="en-US"/>
           </a:p>
@@ -7733,7 +7735,7 @@
               <a:pPr>
                 <a:defRPr/>
               </a:pPr>
-              <a:t>10/9/2017</a:t>
+              <a:t>10/12/2017</a:t>
             </a:fld>
             <a:endParaRPr lang="en-US"/>
           </a:p>
@@ -8060,7 +8062,7 @@
               <a:pPr>
                 <a:defRPr/>
               </a:pPr>
-              <a:t>10/9/2017</a:t>
+              <a:t>10/12/2017</a:t>
             </a:fld>
             <a:endParaRPr lang="en-US"/>
           </a:p>
@@ -8595,7 +8597,7 @@
               <a:pPr>
                 <a:defRPr/>
               </a:pPr>
-              <a:t>10/9/2017</a:t>
+              <a:t>10/12/2017</a:t>
             </a:fld>
             <a:endParaRPr lang="en-US"/>
           </a:p>
@@ -9193,8 +9195,8 @@
               <a:defRPr/>
             </a:pPr>
             <a:r>
-              <a:rPr lang="en-US" altLang="en-US"/>
-              <a:t>How To Not Fail At Storm</a:t>
+              <a:rPr lang="en-US" altLang="en-US" dirty="0"/>
+              <a:t>How To Not Fail with Apache Storm</a:t>
             </a:r>
           </a:p>
         </p:txBody>
@@ -9231,7 +9233,7 @@
               </a:spcAft>
             </a:pPr>
             <a:r>
-              <a:rPr lang="en-US" altLang="en-US">
+              <a:rPr lang="en-US" altLang="en-US" dirty="0">
                 <a:solidFill>
                   <a:srgbClr val="0F496F"/>
                 </a:solidFill>
@@ -9246,7 +9248,7 @@
               </a:spcAft>
             </a:pPr>
             <a:r>
-              <a:rPr lang="en-US" altLang="en-US">
+              <a:rPr lang="en-US" altLang="en-US" dirty="0">
                 <a:solidFill>
                   <a:srgbClr val="0F496F"/>
                 </a:solidFill>
@@ -9261,13 +9263,40 @@
               </a:spcAft>
             </a:pPr>
             <a:r>
-              <a:rPr lang="en-US" altLang="en-US">
+              <a:rPr lang="en-US" altLang="en-US" dirty="0">
                 <a:solidFill>
                   <a:srgbClr val="0F496F"/>
                 </a:solidFill>
               </a:rPr>
-              <a:t>9/2015</a:t>
-            </a:r>
+              <a:t>10/12/2017</a:t>
+            </a:r>
+          </a:p>
+          <a:p>
+            <a:pPr eaLnBrk="1" hangingPunct="1">
+              <a:spcAft>
+                <a:spcPct val="0"/>
+              </a:spcAft>
+            </a:pPr>
+            <a:r>
+              <a:rPr lang="en-US" altLang="en-US" sz="1100" dirty="0">
+                <a:solidFill>
+                  <a:srgbClr val="0F496F"/>
+                </a:solidFill>
+              </a:rPr>
+              <a:t>Created 9/2015</a:t>
+            </a:r>
+          </a:p>
+          <a:p>
+            <a:pPr eaLnBrk="1" hangingPunct="1">
+              <a:spcAft>
+                <a:spcPct val="0"/>
+              </a:spcAft>
+            </a:pPr>
+            <a:endParaRPr lang="en-US" altLang="en-US" dirty="0">
+              <a:solidFill>
+                <a:srgbClr val="0F496F"/>
+              </a:solidFill>
+            </a:endParaRPr>
           </a:p>
         </p:txBody>
       </p:sp>
@@ -9301,7 +9330,7 @@
           <p:cNvPr id="2" name="Title 1">
             <a:extLst>
               <a:ext uri="{FF2B5EF4-FFF2-40B4-BE49-F238E27FC236}">
-                <a16:creationId xmlns:a16="http://schemas.microsoft.com/office/drawing/2014/main" id="{3A6AF4A6-36D9-47C4-8975-CC329DC1E134}"/>
+                <a16:creationId xmlns:a16="http://schemas.microsoft.com/office/drawing/2014/main" id="{96D61E05-4150-4D7B-BE69-AA01E2BAD6C7}"/>
               </a:ext>
             </a:extLst>
           </p:cNvPr>
@@ -9330,84 +9359,107 @@
             </a:pPr>
             <a:r>
               <a:rPr lang="en-US" dirty="0"/>
-              <a:t>Testing part 2</a:t>
-            </a:r>
-          </a:p>
-        </p:txBody>
-      </p:sp>
-      <p:sp>
-        <p:nvSpPr>
-          <p:cNvPr id="19459" name="Content Placeholder 2">
+              <a:t>Demo</a:t>
+            </a:r>
+          </a:p>
+        </p:txBody>
+      </p:sp>
+      <p:pic>
+        <p:nvPicPr>
+          <p:cNvPr id="16387" name="Content Placeholder 3">
             <a:extLst>
               <a:ext uri="{FF2B5EF4-FFF2-40B4-BE49-F238E27FC236}">
-                <a16:creationId xmlns:a16="http://schemas.microsoft.com/office/drawing/2014/main" id="{4F25AAC0-D747-4FA0-B936-396B50B24B2D}"/>
+                <a16:creationId xmlns:a16="http://schemas.microsoft.com/office/drawing/2014/main" id="{D44B11A0-2B5C-4D7D-A209-22F1FEA69BD0}"/>
               </a:ext>
             </a:extLst>
           </p:cNvPr>
-          <p:cNvSpPr>
-            <a:spLocks noGrp="1"/>
-          </p:cNvSpPr>
+          <p:cNvPicPr>
+            <a:picLocks noGrp="1" noChangeAspect="1"/>
+          </p:cNvPicPr>
           <p:nvPr>
             <p:ph idx="1"/>
           </p:nvPr>
-        </p:nvSpPr>
+        </p:nvPicPr>
+        <p:blipFill>
+          <a:blip r:embed="rId2">
+            <a:extLst>
+              <a:ext uri="{28A0092B-C50C-407E-A947-70E740481C1C}">
+                <a14:useLocalDpi xmlns:a14="http://schemas.microsoft.com/office/drawing/2010/main" val="0"/>
+              </a:ext>
+            </a:extLst>
+          </a:blip>
+          <a:srcRect/>
+          <a:stretch>
+            <a:fillRect/>
+          </a:stretch>
+        </p:blipFill>
         <p:spPr>
           <a:xfrm>
-            <a:off x="533400" y="533400"/>
-            <a:ext cx="6554788" cy="3767138"/>
+            <a:off x="611188" y="685800"/>
+            <a:ext cx="7161212" cy="1989138"/>
           </a:xfrm>
         </p:spPr>
-        <p:txBody>
-          <a:bodyPr/>
-          <a:lstStyle/>
-          <a:p>
-            <a:pPr eaLnBrk="1" hangingPunct="1"/>
-            <a:r>
-              <a:rPr lang="en-US" altLang="en-US"/>
-              <a:t>Integration Testing</a:t>
-            </a:r>
-          </a:p>
-          <a:p>
-            <a:pPr lvl="1" eaLnBrk="1" hangingPunct="1"/>
-            <a:r>
-              <a:rPr lang="en-US" altLang="en-US"/>
-              <a:t>Connections to HDFS, Hbase, Solr, Relational DB…</a:t>
-            </a:r>
-          </a:p>
-          <a:p>
-            <a:pPr lvl="1" eaLnBrk="1" hangingPunct="1"/>
-            <a:r>
-              <a:rPr lang="en-US" altLang="en-US"/>
-              <a:t>Find: configuration and environment problems</a:t>
-            </a:r>
-          </a:p>
-          <a:p>
-            <a:pPr eaLnBrk="1" hangingPunct="1"/>
-            <a:r>
-              <a:rPr lang="en-US" altLang="en-US"/>
-              <a:t>Load Testing</a:t>
-            </a:r>
-          </a:p>
-          <a:p>
-            <a:pPr lvl="1" eaLnBrk="1" hangingPunct="1"/>
-            <a:r>
-              <a:rPr lang="en-US" altLang="en-US"/>
-              <a:t>Complete end to end test with load comparable to PROD</a:t>
-            </a:r>
-          </a:p>
-          <a:p>
-            <a:pPr lvl="1" eaLnBrk="1" hangingPunct="1"/>
-            <a:r>
-              <a:rPr lang="en-US" altLang="en-US"/>
-              <a:t>Find: bolts which need optimization, environment settings to optimize</a:t>
-            </a:r>
-          </a:p>
-          <a:p>
-            <a:pPr eaLnBrk="1" hangingPunct="1"/>
-            <a:endParaRPr lang="en-US" altLang="en-US"/>
-          </a:p>
-        </p:txBody>
-      </p:sp>
+      </p:pic>
+      <p:pic>
+        <p:nvPicPr>
+          <p:cNvPr id="16388" name="Picture 4">
+            <a:extLst>
+              <a:ext uri="{FF2B5EF4-FFF2-40B4-BE49-F238E27FC236}">
+                <a16:creationId xmlns:a16="http://schemas.microsoft.com/office/drawing/2014/main" id="{79F2A6D4-9377-4BDF-93EB-2D00AE35D1F2}"/>
+              </a:ext>
+            </a:extLst>
+          </p:cNvPr>
+          <p:cNvPicPr>
+            <a:picLocks noChangeAspect="1"/>
+          </p:cNvPicPr>
+          <p:nvPr/>
+        </p:nvPicPr>
+        <p:blipFill>
+          <a:blip r:embed="rId3">
+            <a:extLst>
+              <a:ext uri="{28A0092B-C50C-407E-A947-70E740481C1C}">
+                <a14:useLocalDpi xmlns:a14="http://schemas.microsoft.com/office/drawing/2010/main" val="0"/>
+              </a:ext>
+            </a:extLst>
+          </a:blip>
+          <a:srcRect/>
+          <a:stretch>
+            <a:fillRect/>
+          </a:stretch>
+        </p:blipFill>
+        <p:spPr bwMode="auto">
+          <a:xfrm>
+            <a:off x="2286000" y="2971800"/>
+            <a:ext cx="5518150" cy="3317875"/>
+          </a:xfrm>
+          <a:prstGeom prst="rect">
+            <a:avLst/>
+          </a:prstGeom>
+          <a:noFill/>
+          <a:ln>
+            <a:noFill/>
+          </a:ln>
+          <a:extLst>
+            <a:ext uri="{909E8E84-426E-40DD-AFC4-6F175D3DCCD1}">
+              <a14:hiddenFill xmlns:a14="http://schemas.microsoft.com/office/drawing/2010/main">
+                <a:solidFill>
+                  <a:srgbClr val="FFFFFF"/>
+                </a:solidFill>
+              </a14:hiddenFill>
+            </a:ext>
+            <a:ext uri="{91240B29-F687-4F45-9708-019B960494DF}">
+              <a14:hiddenLine xmlns:a14="http://schemas.microsoft.com/office/drawing/2010/main" w="9525">
+                <a:solidFill>
+                  <a:srgbClr val="000000"/>
+                </a:solidFill>
+                <a:miter lim="800000"/>
+                <a:headEnd/>
+                <a:tailEnd/>
+              </a14:hiddenLine>
+            </a:ext>
+          </a:extLst>
+        </p:spPr>
+      </p:pic>
     </p:spTree>
   </p:cSld>
   <p:clrMapOvr>
@@ -9435,10 +9487,10 @@
       </p:grpSpPr>
       <p:sp>
         <p:nvSpPr>
-          <p:cNvPr id="8194" name="Title 1">
+          <p:cNvPr id="7170" name="Title 1">
             <a:extLst>
               <a:ext uri="{FF2B5EF4-FFF2-40B4-BE49-F238E27FC236}">
-                <a16:creationId xmlns:a16="http://schemas.microsoft.com/office/drawing/2014/main" id="{1673D628-0CD9-4787-ADEE-FC627AD68BD1}"/>
+                <a16:creationId xmlns:a16="http://schemas.microsoft.com/office/drawing/2014/main" id="{9FF54A6E-276E-43A5-9231-33F0EB4C4B14}"/>
               </a:ext>
             </a:extLst>
           </p:cNvPr>
@@ -9465,16 +9517,9 @@
               </a:spcAft>
               <a:defRPr/>
             </a:pPr>
-            <a:br>
-              <a:rPr lang="en-US" altLang="en-US" dirty="0"/>
-            </a:br>
-            <a:r>
-              <a:rPr lang="en-US" altLang="en-US" dirty="0"/>
-              <a:t>PRODUCTION </a:t>
-            </a:r>
             <a:r>
               <a:rPr lang="en-US" altLang="en-US" dirty="0" err="1"/>
-              <a:t>DeploymenT</a:t>
+              <a:t>TestinG</a:t>
             </a:r>
             <a:endParaRPr lang="en-US" altLang="en-US" dirty="0"/>
           </a:p>
@@ -9482,10 +9527,10 @@
       </p:sp>
       <p:sp>
         <p:nvSpPr>
-          <p:cNvPr id="20483" name="Content Placeholder 2">
+          <p:cNvPr id="17411" name="Content Placeholder 2">
             <a:extLst>
               <a:ext uri="{FF2B5EF4-FFF2-40B4-BE49-F238E27FC236}">
-                <a16:creationId xmlns:a16="http://schemas.microsoft.com/office/drawing/2014/main" id="{C6E60136-9973-47A8-89E1-A0B26B59ED8D}"/>
+                <a16:creationId xmlns:a16="http://schemas.microsoft.com/office/drawing/2014/main" id="{CE26DEFE-CBCA-4566-A471-9EEF697F692E}"/>
               </a:ext>
             </a:extLst>
           </p:cNvPr>
@@ -9509,28 +9554,28 @@
             <a:pPr eaLnBrk="1" hangingPunct="1"/>
             <a:r>
               <a:rPr lang="en-US" altLang="en-US"/>
-              <a:t>Uber-jar packaged up and deployed to cluster</a:t>
-            </a:r>
-          </a:p>
-          <a:p>
-            <a:pPr eaLnBrk="1" hangingPunct="1"/>
+              <a:t>Unit Testing</a:t>
+            </a:r>
+          </a:p>
+          <a:p>
+            <a:pPr lvl="1" eaLnBrk="1" hangingPunct="1"/>
             <a:r>
               <a:rPr lang="en-US" altLang="en-US"/>
-              <a:t>Numbers of Storm nodes/workers/executors/tasks</a:t>
+              <a:t>Depend on unit tests from the start, Mockito is your friend</a:t>
             </a:r>
           </a:p>
           <a:p>
             <a:pPr lvl="1" eaLnBrk="1" hangingPunct="1"/>
             <a:r>
               <a:rPr lang="en-US" altLang="en-US"/>
-              <a:t>Make this configurable</a:t>
+              <a:t>Identify logic problems as early as possible</a:t>
             </a:r>
           </a:p>
           <a:p>
             <a:pPr lvl="1" eaLnBrk="1" hangingPunct="1"/>
             <a:r>
               <a:rPr lang="en-US" altLang="en-US"/>
-              <a:t>Based on results from testing</a:t>
+              <a:t>Find a bug? Create a unit test!</a:t>
             </a:r>
           </a:p>
           <a:p>
@@ -9550,20 +9595,17 @@
             <a:endParaRPr lang="en-US" altLang="en-US"/>
           </a:p>
           <a:p>
-            <a:pPr eaLnBrk="1" hangingPunct="1">
-              <a:buFont typeface="Arial" panose="020B0604020202020204" pitchFamily="34" charset="0"/>
-              <a:buNone/>
-            </a:pPr>
+            <a:pPr lvl="1" eaLnBrk="1" hangingPunct="1"/>
             <a:endParaRPr lang="en-US" altLang="en-US"/>
           </a:p>
         </p:txBody>
       </p:sp>
       <p:pic>
         <p:nvPicPr>
-          <p:cNvPr id="20484" name="Picture 3">
+          <p:cNvPr id="17412" name="Picture 1">
             <a:extLst>
               <a:ext uri="{FF2B5EF4-FFF2-40B4-BE49-F238E27FC236}">
-                <a16:creationId xmlns:a16="http://schemas.microsoft.com/office/drawing/2014/main" id="{F3BEF4D1-7710-410C-A081-BCC11B28D1CC}"/>
+                <a16:creationId xmlns:a16="http://schemas.microsoft.com/office/drawing/2014/main" id="{31432DC9-1821-467B-9791-645CBC0D7477}"/>
               </a:ext>
             </a:extLst>
           </p:cNvPr>
@@ -9580,27 +9622,22 @@
               </a:ext>
             </a:extLst>
           </a:blip>
-          <a:srcRect t="8411"/>
+          <a:srcRect/>
           <a:stretch>
             <a:fillRect/>
           </a:stretch>
         </p:blipFill>
         <p:spPr bwMode="auto">
           <a:xfrm>
-            <a:off x="533400" y="2209800"/>
-            <a:ext cx="7767638" cy="2960688"/>
+            <a:off x="2743200" y="2590800"/>
+            <a:ext cx="5829300" cy="3000375"/>
           </a:xfrm>
           <a:prstGeom prst="rect">
             <a:avLst/>
           </a:prstGeom>
           <a:noFill/>
-          <a:ln w="9525">
-            <a:solidFill>
-              <a:schemeClr val="accent1"/>
-            </a:solidFill>
-            <a:miter lim="800000"/>
-            <a:headEnd/>
-            <a:tailEnd/>
+          <a:ln>
+            <a:noFill/>
           </a:ln>
           <a:extLst>
             <a:ext uri="{909E8E84-426E-40DD-AFC4-6F175D3DCCD1}">
@@ -9609,6 +9646,16 @@
                   <a:srgbClr val="FFFFFF"/>
                 </a:solidFill>
               </a14:hiddenFill>
+            </a:ext>
+            <a:ext uri="{91240B29-F687-4F45-9708-019B960494DF}">
+              <a14:hiddenLine xmlns:a14="http://schemas.microsoft.com/office/drawing/2010/main" w="9525">
+                <a:solidFill>
+                  <a:srgbClr val="000000"/>
+                </a:solidFill>
+                <a:miter lim="800000"/>
+                <a:headEnd/>
+                <a:tailEnd/>
+              </a14:hiddenLine>
             </a:ext>
           </a:extLst>
         </p:spPr>
@@ -9640,10 +9687,10 @@
       </p:grpSpPr>
       <p:sp>
         <p:nvSpPr>
-          <p:cNvPr id="9218" name="Title 1">
+          <p:cNvPr id="2" name="Title 1">
             <a:extLst>
               <a:ext uri="{FF2B5EF4-FFF2-40B4-BE49-F238E27FC236}">
-                <a16:creationId xmlns:a16="http://schemas.microsoft.com/office/drawing/2014/main" id="{62F35FA6-49D7-4A85-A967-FD7CEB39DDC0}"/>
+                <a16:creationId xmlns:a16="http://schemas.microsoft.com/office/drawing/2014/main" id="{3A6AF4A6-36D9-47C4-8975-CC329DC1E134}"/>
               </a:ext>
             </a:extLst>
           </p:cNvPr>
@@ -9671,18 +9718,18 @@
               <a:defRPr/>
             </a:pPr>
             <a:r>
-              <a:rPr lang="en-US" altLang="en-US" dirty="0"/>
-              <a:t>Production Deployment</a:t>
-            </a:r>
-          </a:p>
-        </p:txBody>
-      </p:sp>
-      <p:sp>
-        <p:nvSpPr>
-          <p:cNvPr id="22531" name="Content Placeholder 2">
+              <a:rPr lang="en-US" dirty="0"/>
+              <a:t>Testing part 2</a:t>
+            </a:r>
+          </a:p>
+        </p:txBody>
+      </p:sp>
+      <p:sp>
+        <p:nvSpPr>
+          <p:cNvPr id="19459" name="Content Placeholder 2">
             <a:extLst>
               <a:ext uri="{FF2B5EF4-FFF2-40B4-BE49-F238E27FC236}">
-                <a16:creationId xmlns:a16="http://schemas.microsoft.com/office/drawing/2014/main" id="{BE32173A-28D4-452C-BA4F-2784FBCEAE99}"/>
+                <a16:creationId xmlns:a16="http://schemas.microsoft.com/office/drawing/2014/main" id="{4F25AAC0-D747-4FA0-B936-396B50B24B2D}"/>
               </a:ext>
             </a:extLst>
           </p:cNvPr>
@@ -9706,64 +9753,47 @@
             <a:pPr eaLnBrk="1" hangingPunct="1"/>
             <a:r>
               <a:rPr lang="en-US" altLang="en-US"/>
-              <a:t>Tolerate errors and outages</a:t>
+              <a:t>Integration Testing</a:t>
+            </a:r>
+          </a:p>
+          <a:p>
+            <a:pPr lvl="1" eaLnBrk="1" hangingPunct="1"/>
+            <a:r>
+              <a:rPr lang="en-US" altLang="en-US"/>
+              <a:t>Connections to HDFS, Hbase, Solr, Relational DB…</a:t>
+            </a:r>
+          </a:p>
+          <a:p>
+            <a:pPr lvl="1" eaLnBrk="1" hangingPunct="1"/>
+            <a:r>
+              <a:rPr lang="en-US" altLang="en-US"/>
+              <a:t>Find: configuration and environment problems</a:t>
             </a:r>
           </a:p>
           <a:p>
             <a:pPr eaLnBrk="1" hangingPunct="1"/>
             <a:r>
               <a:rPr lang="en-US" altLang="en-US"/>
-              <a:t>Updating a topology</a:t>
+              <a:t>Load Testing</a:t>
             </a:r>
           </a:p>
           <a:p>
             <a:pPr lvl="1" eaLnBrk="1" hangingPunct="1"/>
             <a:r>
               <a:rPr lang="en-US" altLang="en-US"/>
-              <a:t>Configuration over code</a:t>
+              <a:t>Complete end to end test with load comparable to PROD</a:t>
+            </a:r>
+          </a:p>
+          <a:p>
+            <a:pPr lvl="1" eaLnBrk="1" hangingPunct="1"/>
+            <a:r>
+              <a:rPr lang="en-US" altLang="en-US"/>
+              <a:t>Find: bolts which need optimization, environment settings to optimize</a:t>
             </a:r>
           </a:p>
           <a:p>
             <a:pPr eaLnBrk="1" hangingPunct="1"/>
-            <a:r>
-              <a:rPr lang="en-US" altLang="en-US"/>
-              <a:t>Increasing load over time</a:t>
-            </a:r>
-          </a:p>
-          <a:p>
-            <a:pPr eaLnBrk="1" hangingPunct="1"/>
-            <a:r>
-              <a:rPr lang="en-US" altLang="en-US"/>
-              <a:t>Logging and debugging a running topology</a:t>
-            </a:r>
-          </a:p>
-          <a:p>
-            <a:pPr lvl="1" eaLnBrk="1" hangingPunct="1"/>
-            <a:r>
-              <a:rPr lang="en-US" altLang="en-US" sz="1400"/>
-              <a:t>When Nimbus / supervisor / worker dies…</a:t>
-            </a:r>
-          </a:p>
-          <a:p>
-            <a:pPr eaLnBrk="1" hangingPunct="1"/>
-            <a:r>
-              <a:rPr lang="en-US" altLang="en-US"/>
-              <a:t>Common problems:</a:t>
-            </a:r>
-          </a:p>
-          <a:p>
-            <a:pPr lvl="1" eaLnBrk="1" hangingPunct="1"/>
-            <a:r>
-              <a:rPr lang="en-US" altLang="en-US" sz="1600"/>
-              <a:t>Conflicting workloads</a:t>
-            </a:r>
-          </a:p>
-          <a:p>
-            <a:pPr lvl="1" eaLnBrk="1" hangingPunct="1"/>
-            <a:r>
-              <a:rPr lang="en-US" altLang="en-US" sz="1600"/>
-              <a:t>Configuration issues (ex: ULIMIT for storm user)</a:t>
-            </a:r>
+            <a:endParaRPr lang="en-US" altLang="en-US"/>
           </a:p>
         </p:txBody>
       </p:sp>
@@ -9794,10 +9824,10 @@
       </p:grpSpPr>
       <p:sp>
         <p:nvSpPr>
-          <p:cNvPr id="2" name="Title 1">
+          <p:cNvPr id="8194" name="Title 1">
             <a:extLst>
               <a:ext uri="{FF2B5EF4-FFF2-40B4-BE49-F238E27FC236}">
-                <a16:creationId xmlns:a16="http://schemas.microsoft.com/office/drawing/2014/main" id="{F04D1E4D-547D-425F-8A3F-86E0C1E5FD91}"/>
+                <a16:creationId xmlns:a16="http://schemas.microsoft.com/office/drawing/2014/main" id="{1673D628-0CD9-4787-ADEE-FC627AD68BD1}"/>
               </a:ext>
             </a:extLst>
           </p:cNvPr>
@@ -9824,19 +9854,27 @@
               </a:spcAft>
               <a:defRPr/>
             </a:pPr>
-            <a:r>
-              <a:rPr lang="en-US" dirty="0"/>
-              <a:t>Resources</a:t>
-            </a:r>
-          </a:p>
-        </p:txBody>
-      </p:sp>
-      <p:sp>
-        <p:nvSpPr>
-          <p:cNvPr id="24579" name="Content Placeholder 2">
+            <a:br>
+              <a:rPr lang="en-US" altLang="en-US" dirty="0"/>
+            </a:br>
+            <a:r>
+              <a:rPr lang="en-US" altLang="en-US" dirty="0"/>
+              <a:t>PRODUCTION </a:t>
+            </a:r>
+            <a:r>
+              <a:rPr lang="en-US" altLang="en-US" dirty="0" err="1"/>
+              <a:t>DeploymenT</a:t>
+            </a:r>
+            <a:endParaRPr lang="en-US" altLang="en-US" dirty="0"/>
+          </a:p>
+        </p:txBody>
+      </p:sp>
+      <p:sp>
+        <p:nvSpPr>
+          <p:cNvPr id="20483" name="Content Placeholder 2">
             <a:extLst>
               <a:ext uri="{FF2B5EF4-FFF2-40B4-BE49-F238E27FC236}">
-                <a16:creationId xmlns:a16="http://schemas.microsoft.com/office/drawing/2014/main" id="{5018E7B8-31E0-4326-9A6D-0627AA1FA5A7}"/>
+                <a16:creationId xmlns:a16="http://schemas.microsoft.com/office/drawing/2014/main" id="{C6E60136-9973-47A8-89E1-A0B26B59ED8D}"/>
               </a:ext>
             </a:extLst>
           </p:cNvPr>
@@ -9860,111 +9898,110 @@
             <a:pPr eaLnBrk="1" hangingPunct="1"/>
             <a:r>
               <a:rPr lang="en-US" altLang="en-US"/>
-              <a:t>Storm: </a:t>
-            </a:r>
-            <a:r>
-              <a:rPr lang="en-US" altLang="en-US">
-                <a:hlinkClick r:id="rId2"/>
-              </a:rPr>
-              <a:t>http://storm.apache.org/</a:t>
-            </a:r>
+              <a:t>Uber-jar packaged up and deployed to cluster</a:t>
+            </a:r>
+          </a:p>
+          <a:p>
+            <a:pPr eaLnBrk="1" hangingPunct="1"/>
             <a:r>
               <a:rPr lang="en-US" altLang="en-US"/>
-              <a:t> </a:t>
-            </a:r>
-          </a:p>
-          <a:p>
-            <a:pPr eaLnBrk="1" hangingPunct="1"/>
-            <a:r>
-              <a:rPr lang="en-US" altLang="en-US">
-                <a:hlinkClick r:id="rId3"/>
-              </a:rPr>
-              <a:t>https://github.com/kitmenke/storm-stlhug-demo</a:t>
-            </a:r>
+              <a:t>Numbers of Storm nodes/workers/executors/tasks</a:t>
+            </a:r>
+          </a:p>
+          <a:p>
+            <a:pPr lvl="1" eaLnBrk="1" hangingPunct="1"/>
             <a:r>
               <a:rPr lang="en-US" altLang="en-US"/>
-              <a:t> </a:t>
-            </a:r>
-          </a:p>
-          <a:p>
-            <a:pPr eaLnBrk="1" hangingPunct="1"/>
-            <a:r>
-              <a:rPr lang="en-US" altLang="en-US">
-                <a:hlinkClick r:id="rId4"/>
-              </a:rPr>
-              <a:t>http://hortonworks.com/hadoop/storm/</a:t>
-            </a:r>
+              <a:t>Make this configurable</a:t>
+            </a:r>
+          </a:p>
+          <a:p>
+            <a:pPr lvl="1" eaLnBrk="1" hangingPunct="1"/>
             <a:r>
               <a:rPr lang="en-US" altLang="en-US"/>
-              <a:t> </a:t>
-            </a:r>
-          </a:p>
-          <a:p>
-            <a:pPr eaLnBrk="1" hangingPunct="1"/>
-            <a:r>
-              <a:rPr lang="en-US" altLang="en-US">
-                <a:hlinkClick r:id="rId5"/>
-              </a:rPr>
-              <a:t>Kit Menke’s Blog</a:t>
-            </a:r>
-            <a:r>
-              <a:rPr lang="en-US" altLang="en-US"/>
-              <a:t> (</a:t>
-            </a:r>
-            <a:r>
-              <a:rPr lang="en-US" altLang="en-US">
-                <a:hlinkClick r:id="rId6"/>
-              </a:rPr>
-              <a:t>@kitmenke</a:t>
-            </a:r>
-            <a:r>
-              <a:rPr lang="en-US" altLang="en-US"/>
-              <a:t>)</a:t>
+              <a:t>Based on results from testing</a:t>
             </a:r>
           </a:p>
           <a:p>
             <a:pPr lvl="1" eaLnBrk="1" hangingPunct="1"/>
-            <a:r>
-              <a:rPr lang="en-US" altLang="en-US">
-                <a:hlinkClick r:id="rId7"/>
-              </a:rPr>
-              <a:t>Getting started with Storm: Logging</a:t>
-            </a:r>
             <a:endParaRPr lang="en-US" altLang="en-US"/>
           </a:p>
           <a:p>
             <a:pPr lvl="1" eaLnBrk="1" hangingPunct="1"/>
-            <a:r>
-              <a:rPr lang="en-US" altLang="en-US">
-                <a:hlinkClick r:id="rId8"/>
-              </a:rPr>
-              <a:t>Tick tuples within Storm</a:t>
-            </a:r>
             <a:endParaRPr lang="en-US" altLang="en-US"/>
           </a:p>
           <a:p>
-            <a:pPr eaLnBrk="1" hangingPunct="1"/>
-            <a:r>
-              <a:rPr lang="en-US" altLang="en-US"/>
-              <a:t>Adam Doyle (</a:t>
-            </a:r>
-            <a:r>
-              <a:rPr lang="en-US" altLang="en-US">
-                <a:hlinkClick r:id="rId9"/>
-              </a:rPr>
-              <a:t>@mypetrock</a:t>
-            </a:r>
-            <a:r>
-              <a:rPr lang="en-US" altLang="en-US"/>
-              <a:t>)</a:t>
-            </a:r>
-          </a:p>
-          <a:p>
-            <a:pPr eaLnBrk="1" hangingPunct="1"/>
+            <a:pPr lvl="1" eaLnBrk="1" hangingPunct="1"/>
             <a:endParaRPr lang="en-US" altLang="en-US"/>
           </a:p>
-        </p:txBody>
-      </p:sp>
+          <a:p>
+            <a:pPr lvl="1" eaLnBrk="1" hangingPunct="1"/>
+            <a:endParaRPr lang="en-US" altLang="en-US"/>
+          </a:p>
+          <a:p>
+            <a:pPr eaLnBrk="1" hangingPunct="1">
+              <a:buFont typeface="Arial" panose="020B0604020202020204" pitchFamily="34" charset="0"/>
+              <a:buNone/>
+            </a:pPr>
+            <a:endParaRPr lang="en-US" altLang="en-US"/>
+          </a:p>
+        </p:txBody>
+      </p:sp>
+      <p:pic>
+        <p:nvPicPr>
+          <p:cNvPr id="20484" name="Picture 3">
+            <a:extLst>
+              <a:ext uri="{FF2B5EF4-FFF2-40B4-BE49-F238E27FC236}">
+                <a16:creationId xmlns:a16="http://schemas.microsoft.com/office/drawing/2014/main" id="{F3BEF4D1-7710-410C-A081-BCC11B28D1CC}"/>
+              </a:ext>
+            </a:extLst>
+          </p:cNvPr>
+          <p:cNvPicPr>
+            <a:picLocks noChangeAspect="1"/>
+          </p:cNvPicPr>
+          <p:nvPr/>
+        </p:nvPicPr>
+        <p:blipFill>
+          <a:blip r:embed="rId3">
+            <a:extLst>
+              <a:ext uri="{28A0092B-C50C-407E-A947-70E740481C1C}">
+                <a14:useLocalDpi xmlns:a14="http://schemas.microsoft.com/office/drawing/2010/main" val="0"/>
+              </a:ext>
+            </a:extLst>
+          </a:blip>
+          <a:srcRect t="8411"/>
+          <a:stretch>
+            <a:fillRect/>
+          </a:stretch>
+        </p:blipFill>
+        <p:spPr bwMode="auto">
+          <a:xfrm>
+            <a:off x="533400" y="2209800"/>
+            <a:ext cx="7767638" cy="2960688"/>
+          </a:xfrm>
+          <a:prstGeom prst="rect">
+            <a:avLst/>
+          </a:prstGeom>
+          <a:noFill/>
+          <a:ln w="9525">
+            <a:solidFill>
+              <a:schemeClr val="accent1"/>
+            </a:solidFill>
+            <a:miter lim="800000"/>
+            <a:headEnd/>
+            <a:tailEnd/>
+          </a:ln>
+          <a:extLst>
+            <a:ext uri="{909E8E84-426E-40DD-AFC4-6F175D3DCCD1}">
+              <a14:hiddenFill xmlns:a14="http://schemas.microsoft.com/office/drawing/2010/main">
+                <a:solidFill>
+                  <a:srgbClr val="FFFFFF"/>
+                </a:solidFill>
+              </a14:hiddenFill>
+            </a:ext>
+          </a:extLst>
+        </p:spPr>
+      </p:pic>
     </p:spTree>
   </p:cSld>
   <p:clrMapOvr>
@@ -9992,6 +10029,358 @@
       </p:grpSpPr>
       <p:sp>
         <p:nvSpPr>
+          <p:cNvPr id="9218" name="Title 1">
+            <a:extLst>
+              <a:ext uri="{FF2B5EF4-FFF2-40B4-BE49-F238E27FC236}">
+                <a16:creationId xmlns:a16="http://schemas.microsoft.com/office/drawing/2014/main" id="{62F35FA6-49D7-4A85-A967-FD7CEB39DDC0}"/>
+              </a:ext>
+            </a:extLst>
+          </p:cNvPr>
+          <p:cNvSpPr>
+            <a:spLocks noGrp="1"/>
+          </p:cNvSpPr>
+          <p:nvPr>
+            <p:ph type="title"/>
+          </p:nvPr>
+        </p:nvSpPr>
+        <p:spPr>
+          <a:xfrm>
+            <a:off x="533400" y="4495800"/>
+            <a:ext cx="6554788" cy="1524000"/>
+          </a:xfrm>
+        </p:spPr>
+        <p:txBody>
+          <a:bodyPr/>
+          <a:lstStyle/>
+          <a:p>
+            <a:pPr eaLnBrk="1" fontAlgn="auto" hangingPunct="1">
+              <a:spcAft>
+                <a:spcPts val="0"/>
+              </a:spcAft>
+              <a:defRPr/>
+            </a:pPr>
+            <a:r>
+              <a:rPr lang="en-US" altLang="en-US" dirty="0"/>
+              <a:t>Production Deployment</a:t>
+            </a:r>
+          </a:p>
+        </p:txBody>
+      </p:sp>
+      <p:sp>
+        <p:nvSpPr>
+          <p:cNvPr id="22531" name="Content Placeholder 2">
+            <a:extLst>
+              <a:ext uri="{FF2B5EF4-FFF2-40B4-BE49-F238E27FC236}">
+                <a16:creationId xmlns:a16="http://schemas.microsoft.com/office/drawing/2014/main" id="{BE32173A-28D4-452C-BA4F-2784FBCEAE99}"/>
+              </a:ext>
+            </a:extLst>
+          </p:cNvPr>
+          <p:cNvSpPr>
+            <a:spLocks noGrp="1"/>
+          </p:cNvSpPr>
+          <p:nvPr>
+            <p:ph idx="1"/>
+          </p:nvPr>
+        </p:nvSpPr>
+        <p:spPr>
+          <a:xfrm>
+            <a:off x="533400" y="533400"/>
+            <a:ext cx="6554788" cy="3767138"/>
+          </a:xfrm>
+        </p:spPr>
+        <p:txBody>
+          <a:bodyPr/>
+          <a:lstStyle/>
+          <a:p>
+            <a:pPr eaLnBrk="1" hangingPunct="1"/>
+            <a:r>
+              <a:rPr lang="en-US" altLang="en-US"/>
+              <a:t>Tolerate errors and outages</a:t>
+            </a:r>
+          </a:p>
+          <a:p>
+            <a:pPr eaLnBrk="1" hangingPunct="1"/>
+            <a:r>
+              <a:rPr lang="en-US" altLang="en-US"/>
+              <a:t>Updating a topology</a:t>
+            </a:r>
+          </a:p>
+          <a:p>
+            <a:pPr lvl="1" eaLnBrk="1" hangingPunct="1"/>
+            <a:r>
+              <a:rPr lang="en-US" altLang="en-US"/>
+              <a:t>Configuration over code</a:t>
+            </a:r>
+          </a:p>
+          <a:p>
+            <a:pPr eaLnBrk="1" hangingPunct="1"/>
+            <a:r>
+              <a:rPr lang="en-US" altLang="en-US"/>
+              <a:t>Increasing load over time</a:t>
+            </a:r>
+          </a:p>
+          <a:p>
+            <a:pPr eaLnBrk="1" hangingPunct="1"/>
+            <a:r>
+              <a:rPr lang="en-US" altLang="en-US"/>
+              <a:t>Logging and debugging a running topology</a:t>
+            </a:r>
+          </a:p>
+          <a:p>
+            <a:pPr lvl="1" eaLnBrk="1" hangingPunct="1"/>
+            <a:r>
+              <a:rPr lang="en-US" altLang="en-US" sz="1400"/>
+              <a:t>When Nimbus / supervisor / worker dies…</a:t>
+            </a:r>
+          </a:p>
+          <a:p>
+            <a:pPr eaLnBrk="1" hangingPunct="1"/>
+            <a:r>
+              <a:rPr lang="en-US" altLang="en-US"/>
+              <a:t>Common problems:</a:t>
+            </a:r>
+          </a:p>
+          <a:p>
+            <a:pPr lvl="1" eaLnBrk="1" hangingPunct="1"/>
+            <a:r>
+              <a:rPr lang="en-US" altLang="en-US" sz="1600"/>
+              <a:t>Conflicting workloads</a:t>
+            </a:r>
+          </a:p>
+          <a:p>
+            <a:pPr lvl="1" eaLnBrk="1" hangingPunct="1"/>
+            <a:r>
+              <a:rPr lang="en-US" altLang="en-US" sz="1600"/>
+              <a:t>Configuration issues (ex: ULIMIT for storm user)</a:t>
+            </a:r>
+          </a:p>
+        </p:txBody>
+      </p:sp>
+    </p:spTree>
+  </p:cSld>
+  <p:clrMapOvr>
+    <a:masterClrMapping/>
+  </p:clrMapOvr>
+</p:sld>
+</file>
+
+<file path=ppt/slides/slide15.xml><?xml version="1.0" encoding="utf-8"?>
+<p:sld xmlns:a="http://schemas.openxmlformats.org/drawingml/2006/main" xmlns:r="http://schemas.openxmlformats.org/officeDocument/2006/relationships" xmlns:p="http://schemas.openxmlformats.org/presentationml/2006/main">
+  <p:cSld>
+    <p:spTree>
+      <p:nvGrpSpPr>
+        <p:cNvPr id="1" name=""/>
+        <p:cNvGrpSpPr/>
+        <p:nvPr/>
+      </p:nvGrpSpPr>
+      <p:grpSpPr>
+        <a:xfrm>
+          <a:off x="0" y="0"/>
+          <a:ext cx="0" cy="0"/>
+          <a:chOff x="0" y="0"/>
+          <a:chExt cx="0" cy="0"/>
+        </a:xfrm>
+      </p:grpSpPr>
+      <p:sp>
+        <p:nvSpPr>
+          <p:cNvPr id="2" name="Title 1">
+            <a:extLst>
+              <a:ext uri="{FF2B5EF4-FFF2-40B4-BE49-F238E27FC236}">
+                <a16:creationId xmlns:a16="http://schemas.microsoft.com/office/drawing/2014/main" id="{F04D1E4D-547D-425F-8A3F-86E0C1E5FD91}"/>
+              </a:ext>
+            </a:extLst>
+          </p:cNvPr>
+          <p:cNvSpPr>
+            <a:spLocks noGrp="1"/>
+          </p:cNvSpPr>
+          <p:nvPr>
+            <p:ph type="title"/>
+          </p:nvPr>
+        </p:nvSpPr>
+        <p:spPr>
+          <a:xfrm>
+            <a:off x="533400" y="4495800"/>
+            <a:ext cx="6554788" cy="1524000"/>
+          </a:xfrm>
+        </p:spPr>
+        <p:txBody>
+          <a:bodyPr/>
+          <a:lstStyle/>
+          <a:p>
+            <a:pPr eaLnBrk="1" fontAlgn="auto" hangingPunct="1">
+              <a:spcAft>
+                <a:spcPts val="0"/>
+              </a:spcAft>
+              <a:defRPr/>
+            </a:pPr>
+            <a:r>
+              <a:rPr lang="en-US" dirty="0"/>
+              <a:t>Resources</a:t>
+            </a:r>
+          </a:p>
+        </p:txBody>
+      </p:sp>
+      <p:sp>
+        <p:nvSpPr>
+          <p:cNvPr id="24579" name="Content Placeholder 2">
+            <a:extLst>
+              <a:ext uri="{FF2B5EF4-FFF2-40B4-BE49-F238E27FC236}">
+                <a16:creationId xmlns:a16="http://schemas.microsoft.com/office/drawing/2014/main" id="{5018E7B8-31E0-4326-9A6D-0627AA1FA5A7}"/>
+              </a:ext>
+            </a:extLst>
+          </p:cNvPr>
+          <p:cNvSpPr>
+            <a:spLocks noGrp="1"/>
+          </p:cNvSpPr>
+          <p:nvPr>
+            <p:ph idx="1"/>
+          </p:nvPr>
+        </p:nvSpPr>
+        <p:spPr>
+          <a:xfrm>
+            <a:off x="533400" y="533400"/>
+            <a:ext cx="6554788" cy="3767138"/>
+          </a:xfrm>
+        </p:spPr>
+        <p:txBody>
+          <a:bodyPr/>
+          <a:lstStyle/>
+          <a:p>
+            <a:pPr eaLnBrk="1" hangingPunct="1"/>
+            <a:r>
+              <a:rPr lang="en-US" altLang="en-US"/>
+              <a:t>Storm: </a:t>
+            </a:r>
+            <a:r>
+              <a:rPr lang="en-US" altLang="en-US">
+                <a:hlinkClick r:id="rId2"/>
+              </a:rPr>
+              <a:t>http://storm.apache.org/</a:t>
+            </a:r>
+            <a:r>
+              <a:rPr lang="en-US" altLang="en-US"/>
+              <a:t> </a:t>
+            </a:r>
+          </a:p>
+          <a:p>
+            <a:pPr eaLnBrk="1" hangingPunct="1"/>
+            <a:r>
+              <a:rPr lang="en-US" altLang="en-US">
+                <a:hlinkClick r:id="rId3"/>
+              </a:rPr>
+              <a:t>https://github.com/kitmenke/storm-stlhug-demo</a:t>
+            </a:r>
+            <a:r>
+              <a:rPr lang="en-US" altLang="en-US"/>
+              <a:t> </a:t>
+            </a:r>
+          </a:p>
+          <a:p>
+            <a:pPr eaLnBrk="1" hangingPunct="1"/>
+            <a:r>
+              <a:rPr lang="en-US" altLang="en-US">
+                <a:hlinkClick r:id="rId4"/>
+              </a:rPr>
+              <a:t>http://hortonworks.com/hadoop/storm/</a:t>
+            </a:r>
+            <a:r>
+              <a:rPr lang="en-US" altLang="en-US"/>
+              <a:t> </a:t>
+            </a:r>
+          </a:p>
+          <a:p>
+            <a:pPr eaLnBrk="1" hangingPunct="1"/>
+            <a:r>
+              <a:rPr lang="en-US" altLang="en-US">
+                <a:hlinkClick r:id="rId5"/>
+              </a:rPr>
+              <a:t>Kit Menke’s Blog</a:t>
+            </a:r>
+            <a:r>
+              <a:rPr lang="en-US" altLang="en-US"/>
+              <a:t> (</a:t>
+            </a:r>
+            <a:r>
+              <a:rPr lang="en-US" altLang="en-US">
+                <a:hlinkClick r:id="rId6"/>
+              </a:rPr>
+              <a:t>@kitmenke</a:t>
+            </a:r>
+            <a:r>
+              <a:rPr lang="en-US" altLang="en-US"/>
+              <a:t>)</a:t>
+            </a:r>
+          </a:p>
+          <a:p>
+            <a:pPr lvl="1" eaLnBrk="1" hangingPunct="1"/>
+            <a:r>
+              <a:rPr lang="en-US" altLang="en-US">
+                <a:hlinkClick r:id="rId7"/>
+              </a:rPr>
+              <a:t>Getting started with Storm: Logging</a:t>
+            </a:r>
+            <a:endParaRPr lang="en-US" altLang="en-US"/>
+          </a:p>
+          <a:p>
+            <a:pPr lvl="1" eaLnBrk="1" hangingPunct="1"/>
+            <a:r>
+              <a:rPr lang="en-US" altLang="en-US">
+                <a:hlinkClick r:id="rId8"/>
+              </a:rPr>
+              <a:t>Tick tuples within Storm</a:t>
+            </a:r>
+            <a:endParaRPr lang="en-US" altLang="en-US"/>
+          </a:p>
+          <a:p>
+            <a:pPr eaLnBrk="1" hangingPunct="1"/>
+            <a:r>
+              <a:rPr lang="en-US" altLang="en-US"/>
+              <a:t>Adam Doyle (</a:t>
+            </a:r>
+            <a:r>
+              <a:rPr lang="en-US" altLang="en-US">
+                <a:hlinkClick r:id="rId9"/>
+              </a:rPr>
+              <a:t>@mypetrock</a:t>
+            </a:r>
+            <a:r>
+              <a:rPr lang="en-US" altLang="en-US"/>
+              <a:t>)</a:t>
+            </a:r>
+          </a:p>
+          <a:p>
+            <a:pPr eaLnBrk="1" hangingPunct="1"/>
+            <a:endParaRPr lang="en-US" altLang="en-US"/>
+          </a:p>
+        </p:txBody>
+      </p:sp>
+    </p:spTree>
+  </p:cSld>
+  <p:clrMapOvr>
+    <a:masterClrMapping/>
+  </p:clrMapOvr>
+</p:sld>
+</file>
+
+<file path=ppt/slides/slide16.xml><?xml version="1.0" encoding="utf-8"?>
+<p:sld xmlns:a="http://schemas.openxmlformats.org/drawingml/2006/main" xmlns:r="http://schemas.openxmlformats.org/officeDocument/2006/relationships" xmlns:p="http://schemas.openxmlformats.org/presentationml/2006/main">
+  <p:cSld>
+    <p:spTree>
+      <p:nvGrpSpPr>
+        <p:cNvPr id="1" name=""/>
+        <p:cNvGrpSpPr/>
+        <p:nvPr/>
+      </p:nvGrpSpPr>
+      <p:grpSpPr>
+        <a:xfrm>
+          <a:off x="0" y="0"/>
+          <a:ext cx="0" cy="0"/>
+          <a:chOff x="0" y="0"/>
+          <a:chExt cx="0" cy="0"/>
+        </a:xfrm>
+      </p:grpSpPr>
+      <p:sp>
+        <p:nvSpPr>
           <p:cNvPr id="10242" name="Title 1">
             <a:extLst>
               <a:ext uri="{FF2B5EF4-FFF2-40B4-BE49-F238E27FC236}">
@@ -10291,48 +10680,55 @@
           <a:lstStyle/>
           <a:p>
             <a:pPr eaLnBrk="1" hangingPunct="1"/>
-            <a:endParaRPr lang="en-US" altLang="en-US"/>
+            <a:endParaRPr lang="en-US" altLang="en-US" dirty="0"/>
           </a:p>
           <a:p>
             <a:pPr eaLnBrk="1" hangingPunct="1"/>
             <a:r>
-              <a:rPr lang="en-US" altLang="en-US"/>
+              <a:rPr lang="en-US" altLang="en-US" dirty="0"/>
               <a:t>System for processing streaming data in real time</a:t>
             </a:r>
           </a:p>
           <a:p>
             <a:pPr eaLnBrk="1" hangingPunct="1"/>
             <a:r>
-              <a:rPr lang="en-US" altLang="en-US"/>
+              <a:rPr lang="en-US" altLang="en-US" dirty="0"/>
               <a:t>Why would you use it?</a:t>
             </a:r>
           </a:p>
           <a:p>
             <a:pPr lvl="1" eaLnBrk="1" hangingPunct="1"/>
             <a:r>
-              <a:rPr lang="en-US" altLang="en-US"/>
+              <a:rPr lang="en-US" altLang="en-US" dirty="0"/>
               <a:t>Highly scalable – Amount of data to be processed will increase in the future</a:t>
             </a:r>
           </a:p>
           <a:p>
             <a:pPr lvl="1" eaLnBrk="1" hangingPunct="1"/>
             <a:r>
-              <a:rPr lang="en-US" altLang="en-US"/>
-              <a:t>Fault tolerant – Must run 24/7, recover automatically from failures</a:t>
+              <a:rPr lang="en-US" altLang="en-US" dirty="0"/>
+              <a:t>Fault tolerant – Must run 24/7, recover automatically from faults</a:t>
             </a:r>
           </a:p>
           <a:p>
             <a:pPr lvl="1" eaLnBrk="1" hangingPunct="1"/>
             <a:r>
-              <a:rPr lang="en-US" altLang="en-US"/>
+              <a:rPr lang="en-US" altLang="en-US" dirty="0"/>
               <a:t>Guaranteed processing – Need to process every tuple at least once or exactly once</a:t>
             </a:r>
           </a:p>
           <a:p>
             <a:pPr lvl="1" eaLnBrk="1" hangingPunct="1"/>
             <a:r>
-              <a:rPr lang="en-US" altLang="en-US"/>
+              <a:rPr lang="en-US" altLang="en-US" dirty="0"/>
               <a:t>“One message at a time” processing paradigm</a:t>
+            </a:r>
+          </a:p>
+          <a:p>
+            <a:pPr lvl="2" eaLnBrk="1" hangingPunct="1"/>
+            <a:r>
+              <a:rPr lang="en-US" altLang="en-US" dirty="0"/>
+              <a:t>Compare this with Apache Spark’s micro-batch processing</a:t>
             </a:r>
           </a:p>
         </p:txBody>
@@ -10980,7 +11376,7 @@
           <p:cNvPr id="2" name="Title 1">
             <a:extLst>
               <a:ext uri="{FF2B5EF4-FFF2-40B4-BE49-F238E27FC236}">
-                <a16:creationId xmlns:a16="http://schemas.microsoft.com/office/drawing/2014/main" id="{387EE7D8-9EBE-44B1-BD7B-00FB61F5FECE}"/>
+                <a16:creationId xmlns:a16="http://schemas.microsoft.com/office/drawing/2014/main" id="{F934E704-033E-4512-BD85-21A45A6DB913}"/>
               </a:ext>
             </a:extLst>
           </p:cNvPr>
@@ -10991,35 +11387,24 @@
             <p:ph type="title"/>
           </p:nvPr>
         </p:nvSpPr>
-        <p:spPr>
-          <a:xfrm>
-            <a:off x="533400" y="4495800"/>
-            <a:ext cx="6554788" cy="1524000"/>
-          </a:xfrm>
-        </p:spPr>
+        <p:spPr/>
         <p:txBody>
           <a:bodyPr/>
           <a:lstStyle/>
           <a:p>
-            <a:pPr eaLnBrk="1" fontAlgn="auto" hangingPunct="1">
-              <a:spcAft>
-                <a:spcPts val="0"/>
-              </a:spcAft>
-              <a:defRPr/>
-            </a:pPr>
             <a:r>
               <a:rPr lang="en-US" dirty="0"/>
-              <a:t>Development</a:t>
-            </a:r>
-          </a:p>
-        </p:txBody>
-      </p:sp>
-      <p:sp>
-        <p:nvSpPr>
-          <p:cNvPr id="14339" name="Content Placeholder 2">
+              <a:t>Storm cluster (cont.)</a:t>
+            </a:r>
+          </a:p>
+        </p:txBody>
+      </p:sp>
+      <p:sp>
+        <p:nvSpPr>
+          <p:cNvPr id="3" name="Content Placeholder 2">
             <a:extLst>
               <a:ext uri="{FF2B5EF4-FFF2-40B4-BE49-F238E27FC236}">
-                <a16:creationId xmlns:a16="http://schemas.microsoft.com/office/drawing/2014/main" id="{3A592DF3-9FB4-4E3B-AD41-49A7A3B4B9DD}"/>
+                <a16:creationId xmlns:a16="http://schemas.microsoft.com/office/drawing/2014/main" id="{F8C98C87-2B17-44D4-8B85-9296E624F2DF}"/>
               </a:ext>
             </a:extLst>
           </p:cNvPr>
@@ -11030,134 +11415,80 @@
             <p:ph idx="1"/>
           </p:nvPr>
         </p:nvSpPr>
-        <p:spPr>
-          <a:xfrm>
-            <a:off x="533400" y="533400"/>
-            <a:ext cx="6554788" cy="3767138"/>
-          </a:xfrm>
-        </p:spPr>
+        <p:spPr/>
         <p:txBody>
           <a:bodyPr/>
           <a:lstStyle/>
           <a:p>
-            <a:pPr eaLnBrk="1" hangingPunct="1"/>
-            <a:r>
-              <a:rPr lang="en-US" altLang="en-US"/>
-              <a:t>Set up your DEV Environment: Eclipse, Maven, Git</a:t>
-            </a:r>
-          </a:p>
-          <a:p>
-            <a:pPr eaLnBrk="1" hangingPunct="1"/>
-            <a:r>
-              <a:rPr lang="en-US" altLang="en-US"/>
-              <a:t>Use an example to get started: </a:t>
-            </a:r>
-            <a:r>
-              <a:rPr lang="en-US" altLang="en-US">
-                <a:hlinkClick r:id="rId3"/>
-              </a:rPr>
-              <a:t>storm-starter</a:t>
-            </a:r>
-            <a:endParaRPr lang="en-US" altLang="en-US"/>
-          </a:p>
-          <a:p>
-            <a:pPr eaLnBrk="1" hangingPunct="1"/>
-            <a:r>
-              <a:rPr lang="en-US" altLang="en-US"/>
-              <a:t>Plan the topology</a:t>
-            </a:r>
-          </a:p>
-          <a:p>
-            <a:pPr lvl="1" eaLnBrk="1" hangingPunct="1"/>
-            <a:r>
-              <a:rPr lang="en-US" altLang="en-US"/>
-              <a:t>One spout per input</a:t>
-            </a:r>
-          </a:p>
-          <a:p>
-            <a:pPr lvl="1" eaLnBrk="1" hangingPunct="1"/>
-            <a:r>
-              <a:rPr lang="en-US" altLang="en-US"/>
-              <a:t>Split bolts in logical units of work</a:t>
-            </a:r>
-          </a:p>
-          <a:p>
-            <a:pPr eaLnBrk="1" hangingPunct="1"/>
-            <a:r>
-              <a:rPr lang="en-US" altLang="en-US"/>
-              <a:t>Common problems:</a:t>
-            </a:r>
-          </a:p>
-          <a:p>
-            <a:pPr lvl="1" eaLnBrk="1" hangingPunct="1"/>
-            <a:r>
-              <a:rPr lang="en-US" altLang="en-US"/>
-              <a:t>Managing connections, errors in flow, TickTuples, serialization</a:t>
-            </a:r>
-          </a:p>
-        </p:txBody>
-      </p:sp>
-      <p:pic>
-        <p:nvPicPr>
-          <p:cNvPr id="14340" name="Picture 3">
-            <a:extLst>
-              <a:ext uri="{FF2B5EF4-FFF2-40B4-BE49-F238E27FC236}">
-                <a16:creationId xmlns:a16="http://schemas.microsoft.com/office/drawing/2014/main" id="{65ADFBE8-4CC9-4A22-BA6E-2BE211DE4B2C}"/>
-              </a:ext>
-            </a:extLst>
-          </p:cNvPr>
-          <p:cNvPicPr>
-            <a:picLocks noChangeAspect="1"/>
-          </p:cNvPicPr>
-          <p:nvPr/>
-        </p:nvPicPr>
-        <p:blipFill>
-          <a:blip r:embed="rId4">
-            <a:extLst>
-              <a:ext uri="{28A0092B-C50C-407E-A947-70E740481C1C}">
-                <a14:useLocalDpi xmlns:a14="http://schemas.microsoft.com/office/drawing/2010/main" val="0"/>
-              </a:ext>
-            </a:extLst>
-          </a:blip>
-          <a:srcRect/>
-          <a:stretch>
-            <a:fillRect/>
-          </a:stretch>
-        </p:blipFill>
-        <p:spPr bwMode="auto">
-          <a:xfrm>
-            <a:off x="3962400" y="4321175"/>
-            <a:ext cx="4953000" cy="1376363"/>
-          </a:xfrm>
-          <a:prstGeom prst="rect">
-            <a:avLst/>
-          </a:prstGeom>
-          <a:noFill/>
-          <a:ln>
-            <a:noFill/>
-          </a:ln>
-          <a:extLst>
-            <a:ext uri="{909E8E84-426E-40DD-AFC4-6F175D3DCCD1}">
-              <a14:hiddenFill xmlns:a14="http://schemas.microsoft.com/office/drawing/2010/main">
-                <a:solidFill>
-                  <a:srgbClr val="FFFFFF"/>
-                </a:solidFill>
-              </a14:hiddenFill>
-            </a:ext>
-            <a:ext uri="{91240B29-F687-4F45-9708-019B960494DF}">
-              <a14:hiddenLine xmlns:a14="http://schemas.microsoft.com/office/drawing/2010/main" w="9525">
-                <a:solidFill>
-                  <a:srgbClr val="000000"/>
-                </a:solidFill>
-                <a:miter lim="800000"/>
-                <a:headEnd/>
-                <a:tailEnd/>
-              </a14:hiddenLine>
-            </a:ext>
-          </a:extLst>
-        </p:spPr>
-      </p:pic>
+            <a:endParaRPr lang="en-US" dirty="0"/>
+          </a:p>
+          <a:p>
+            <a:r>
+              <a:rPr lang="en-US" dirty="0"/>
+              <a:t>Node</a:t>
+            </a:r>
+          </a:p>
+          <a:p>
+            <a:pPr lvl="1"/>
+            <a:r>
+              <a:rPr lang="en-US" dirty="0"/>
+              <a:t>A server in your cluster, runs workers</a:t>
+            </a:r>
+          </a:p>
+          <a:p>
+            <a:r>
+              <a:rPr lang="en-US" dirty="0"/>
+              <a:t>Workers</a:t>
+            </a:r>
+          </a:p>
+          <a:p>
+            <a:pPr lvl="1"/>
+            <a:r>
+              <a:rPr lang="en-US" dirty="0"/>
+              <a:t>Each worker has its own JVM, runs executors</a:t>
+            </a:r>
+          </a:p>
+          <a:p>
+            <a:r>
+              <a:rPr lang="en-US" dirty="0"/>
+              <a:t>Executors</a:t>
+            </a:r>
+          </a:p>
+          <a:p>
+            <a:pPr lvl="1"/>
+            <a:r>
+              <a:rPr lang="en-US" dirty="0"/>
+              <a:t>Each executor is assigned to a worker in the cluster, runs tasks</a:t>
+            </a:r>
+          </a:p>
+          <a:p>
+            <a:r>
+              <a:rPr lang="en-US" dirty="0"/>
+              <a:t>Tasks</a:t>
+            </a:r>
+          </a:p>
+          <a:p>
+            <a:pPr lvl="1"/>
+            <a:r>
+              <a:rPr lang="en-US"/>
+              <a:t>Instances </a:t>
+            </a:r>
+            <a:r>
+              <a:rPr lang="en-US" dirty="0"/>
+              <a:t>running your spout/bolt code</a:t>
+            </a:r>
+          </a:p>
+          <a:p>
+            <a:endParaRPr lang="en-US" dirty="0"/>
+          </a:p>
+        </p:txBody>
+      </p:sp>
     </p:spTree>
+    <p:extLst>
+      <p:ext uri="{BB962C8B-B14F-4D97-AF65-F5344CB8AC3E}">
+        <p14:creationId xmlns:p14="http://schemas.microsoft.com/office/powerpoint/2010/main" val="980842135"/>
+      </p:ext>
+    </p:extLst>
   </p:cSld>
   <p:clrMapOvr>
     <a:masterClrMapping/>
@@ -11187,7 +11518,7 @@
           <p:cNvPr id="2" name="Title 1">
             <a:extLst>
               <a:ext uri="{FF2B5EF4-FFF2-40B4-BE49-F238E27FC236}">
-                <a16:creationId xmlns:a16="http://schemas.microsoft.com/office/drawing/2014/main" id="{96D61E05-4150-4D7B-BE69-AA01E2BAD6C7}"/>
+                <a16:creationId xmlns:a16="http://schemas.microsoft.com/office/drawing/2014/main" id="{387EE7D8-9EBE-44B1-BD7B-00FB61F5FECE}"/>
               </a:ext>
             </a:extLst>
           </p:cNvPr>
@@ -11216,53 +11547,130 @@
             </a:pPr>
             <a:r>
               <a:rPr lang="en-US" dirty="0"/>
-              <a:t>Demo</a:t>
+              <a:t>Development</a:t>
+            </a:r>
+          </a:p>
+        </p:txBody>
+      </p:sp>
+      <p:sp>
+        <p:nvSpPr>
+          <p:cNvPr id="14339" name="Content Placeholder 2">
+            <a:extLst>
+              <a:ext uri="{FF2B5EF4-FFF2-40B4-BE49-F238E27FC236}">
+                <a16:creationId xmlns:a16="http://schemas.microsoft.com/office/drawing/2014/main" id="{3A592DF3-9FB4-4E3B-AD41-49A7A3B4B9DD}"/>
+              </a:ext>
+            </a:extLst>
+          </p:cNvPr>
+          <p:cNvSpPr>
+            <a:spLocks noGrp="1"/>
+          </p:cNvSpPr>
+          <p:nvPr>
+            <p:ph idx="1"/>
+          </p:nvPr>
+        </p:nvSpPr>
+        <p:spPr>
+          <a:xfrm>
+            <a:off x="533400" y="533400"/>
+            <a:ext cx="6554788" cy="3767138"/>
+          </a:xfrm>
+        </p:spPr>
+        <p:txBody>
+          <a:bodyPr/>
+          <a:lstStyle/>
+          <a:p>
+            <a:pPr eaLnBrk="1" hangingPunct="1"/>
+            <a:r>
+              <a:rPr lang="en-US" altLang="en-US" dirty="0"/>
+              <a:t>Set up your DEV Environment: Eclipse/IntelliJ, Maven, Git</a:t>
+            </a:r>
+          </a:p>
+          <a:p>
+            <a:pPr eaLnBrk="1" hangingPunct="1"/>
+            <a:r>
+              <a:rPr lang="en-US" altLang="en-US" dirty="0"/>
+              <a:t>Use an example to get started: </a:t>
+            </a:r>
+            <a:r>
+              <a:rPr lang="en-US" altLang="en-US" dirty="0">
+                <a:hlinkClick r:id="rId3"/>
+              </a:rPr>
+              <a:t>storm-starter</a:t>
+            </a:r>
+            <a:r>
+              <a:rPr lang="en-US" altLang="en-US" dirty="0"/>
+              <a:t> or </a:t>
+            </a:r>
+            <a:r>
+              <a:rPr lang="en-US" altLang="en-US" dirty="0">
+                <a:hlinkClick r:id="rId4"/>
+              </a:rPr>
+              <a:t>storm-</a:t>
+            </a:r>
+            <a:r>
+              <a:rPr lang="en-US" altLang="en-US" dirty="0" err="1">
+                <a:hlinkClick r:id="rId4"/>
+              </a:rPr>
+              <a:t>stlhug</a:t>
+            </a:r>
+            <a:r>
+              <a:rPr lang="en-US" altLang="en-US" dirty="0">
+                <a:hlinkClick r:id="rId4"/>
+              </a:rPr>
+              <a:t>-demo</a:t>
+            </a:r>
+            <a:endParaRPr lang="en-US" altLang="en-US" dirty="0"/>
+          </a:p>
+          <a:p>
+            <a:pPr eaLnBrk="1" hangingPunct="1"/>
+            <a:r>
+              <a:rPr lang="en-US" altLang="en-US" dirty="0"/>
+              <a:t>Plan the topology</a:t>
+            </a:r>
+          </a:p>
+          <a:p>
+            <a:pPr lvl="1" eaLnBrk="1" hangingPunct="1"/>
+            <a:r>
+              <a:rPr lang="en-US" altLang="en-US" dirty="0"/>
+              <a:t>One spout per input</a:t>
+            </a:r>
+          </a:p>
+          <a:p>
+            <a:pPr lvl="1" eaLnBrk="1" hangingPunct="1"/>
+            <a:r>
+              <a:rPr lang="en-US" altLang="en-US" dirty="0"/>
+              <a:t>Split bolts in logical units of work</a:t>
+            </a:r>
+          </a:p>
+          <a:p>
+            <a:pPr eaLnBrk="1" hangingPunct="1"/>
+            <a:r>
+              <a:rPr lang="en-US" altLang="en-US" dirty="0"/>
+              <a:t>Common problems:</a:t>
+            </a:r>
+          </a:p>
+          <a:p>
+            <a:pPr lvl="1" eaLnBrk="1" hangingPunct="1"/>
+            <a:r>
+              <a:rPr lang="en-US" altLang="en-US" dirty="0"/>
+              <a:t>Managing connections, errors in flow, </a:t>
+            </a:r>
+            <a:r>
+              <a:rPr lang="en-US" altLang="en-US" dirty="0" err="1"/>
+              <a:t>TickTuples</a:t>
+            </a:r>
+            <a:r>
+              <a:rPr lang="en-US" altLang="en-US" dirty="0"/>
+              <a:t>, serialization</a:t>
             </a:r>
           </a:p>
         </p:txBody>
       </p:sp>
       <p:pic>
         <p:nvPicPr>
-          <p:cNvPr id="16387" name="Content Placeholder 3">
+          <p:cNvPr id="14340" name="Picture 3">
             <a:extLst>
               <a:ext uri="{FF2B5EF4-FFF2-40B4-BE49-F238E27FC236}">
-                <a16:creationId xmlns:a16="http://schemas.microsoft.com/office/drawing/2014/main" id="{D44B11A0-2B5C-4D7D-A209-22F1FEA69BD0}"/>
-              </a:ext>
-            </a:extLst>
-          </p:cNvPr>
-          <p:cNvPicPr>
-            <a:picLocks noGrp="1" noChangeAspect="1"/>
-          </p:cNvPicPr>
-          <p:nvPr>
-            <p:ph idx="1"/>
-          </p:nvPr>
-        </p:nvPicPr>
-        <p:blipFill>
-          <a:blip r:embed="rId2">
-            <a:extLst>
-              <a:ext uri="{28A0092B-C50C-407E-A947-70E740481C1C}">
-                <a14:useLocalDpi xmlns:a14="http://schemas.microsoft.com/office/drawing/2010/main" val="0"/>
-              </a:ext>
-            </a:extLst>
-          </a:blip>
-          <a:srcRect/>
-          <a:stretch>
-            <a:fillRect/>
-          </a:stretch>
-        </p:blipFill>
-        <p:spPr>
-          <a:xfrm>
-            <a:off x="611188" y="685800"/>
-            <a:ext cx="7161212" cy="1989138"/>
-          </a:xfrm>
-        </p:spPr>
-      </p:pic>
-      <p:pic>
-        <p:nvPicPr>
-          <p:cNvPr id="16388" name="Picture 4">
-            <a:extLst>
-              <a:ext uri="{FF2B5EF4-FFF2-40B4-BE49-F238E27FC236}">
-                <a16:creationId xmlns:a16="http://schemas.microsoft.com/office/drawing/2014/main" id="{79F2A6D4-9377-4BDF-93EB-2D00AE35D1F2}"/>
+                <a16:creationId xmlns:a16="http://schemas.microsoft.com/office/drawing/2014/main" id="{65ADFBE8-4CC9-4A22-BA6E-2BE211DE4B2C}"/>
               </a:ext>
             </a:extLst>
           </p:cNvPr>
@@ -11272,7 +11680,7 @@
           <p:nvPr/>
         </p:nvPicPr>
         <p:blipFill>
-          <a:blip r:embed="rId3">
+          <a:blip r:embed="rId5">
             <a:extLst>
               <a:ext uri="{28A0092B-C50C-407E-A947-70E740481C1C}">
                 <a14:useLocalDpi xmlns:a14="http://schemas.microsoft.com/office/drawing/2010/main" val="0"/>
@@ -11286,8 +11694,8 @@
         </p:blipFill>
         <p:spPr bwMode="auto">
           <a:xfrm>
-            <a:off x="2286000" y="2971800"/>
-            <a:ext cx="5518150" cy="3317875"/>
+            <a:off x="3962400" y="4321175"/>
+            <a:ext cx="4953000" cy="1376363"/>
           </a:xfrm>
           <a:prstGeom prst="rect">
             <a:avLst/>
@@ -11344,10 +11752,10 @@
       </p:grpSpPr>
       <p:sp>
         <p:nvSpPr>
-          <p:cNvPr id="7170" name="Title 1">
+          <p:cNvPr id="2" name="Title 1">
             <a:extLst>
               <a:ext uri="{FF2B5EF4-FFF2-40B4-BE49-F238E27FC236}">
-                <a16:creationId xmlns:a16="http://schemas.microsoft.com/office/drawing/2014/main" id="{9FF54A6E-276E-43A5-9231-33F0EB4C4B14}"/>
+                <a16:creationId xmlns:a16="http://schemas.microsoft.com/office/drawing/2014/main" id="{1AE9B69B-EF98-4FDF-9B74-69AE3F05EC8B}"/>
               </a:ext>
             </a:extLst>
           </p:cNvPr>
@@ -11358,36 +11766,24 @@
             <p:ph type="title"/>
           </p:nvPr>
         </p:nvSpPr>
-        <p:spPr>
-          <a:xfrm>
-            <a:off x="533400" y="4495800"/>
-            <a:ext cx="6554788" cy="1524000"/>
-          </a:xfrm>
-        </p:spPr>
+        <p:spPr/>
         <p:txBody>
           <a:bodyPr/>
           <a:lstStyle/>
           <a:p>
-            <a:pPr eaLnBrk="1" fontAlgn="auto" hangingPunct="1">
-              <a:spcAft>
-                <a:spcPts val="0"/>
-              </a:spcAft>
-              <a:defRPr/>
-            </a:pPr>
-            <a:r>
-              <a:rPr lang="en-US" altLang="en-US" dirty="0" err="1"/>
-              <a:t>TestinG</a:t>
-            </a:r>
-            <a:endParaRPr lang="en-US" altLang="en-US" dirty="0"/>
-          </a:p>
-        </p:txBody>
-      </p:sp>
-      <p:sp>
-        <p:nvSpPr>
-          <p:cNvPr id="17411" name="Content Placeholder 2">
+            <a:r>
+              <a:rPr lang="en-US" dirty="0"/>
+              <a:t>Execution flow</a:t>
+            </a:r>
+          </a:p>
+        </p:txBody>
+      </p:sp>
+      <p:sp>
+        <p:nvSpPr>
+          <p:cNvPr id="3" name="Content Placeholder 2">
             <a:extLst>
               <a:ext uri="{FF2B5EF4-FFF2-40B4-BE49-F238E27FC236}">
-                <a16:creationId xmlns:a16="http://schemas.microsoft.com/office/drawing/2014/main" id="{CE26DEFE-CBCA-4566-A471-9EEF697F692E}"/>
+                <a16:creationId xmlns:a16="http://schemas.microsoft.com/office/drawing/2014/main" id="{8208A1A6-FED4-4D9F-8EBC-BBD86F874992}"/>
               </a:ext>
             </a:extLst>
           </p:cNvPr>
@@ -11401,123 +11797,90 @@
         <p:spPr>
           <a:xfrm>
             <a:off x="533400" y="533400"/>
-            <a:ext cx="6554788" cy="3767138"/>
+            <a:ext cx="6554867" cy="4495800"/>
           </a:xfrm>
         </p:spPr>
         <p:txBody>
           <a:bodyPr/>
           <a:lstStyle/>
           <a:p>
-            <a:pPr eaLnBrk="1" hangingPunct="1"/>
-            <a:r>
-              <a:rPr lang="en-US" altLang="en-US"/>
-              <a:t>Unit Testing</a:t>
-            </a:r>
-          </a:p>
-          <a:p>
-            <a:pPr lvl="1" eaLnBrk="1" hangingPunct="1"/>
-            <a:r>
-              <a:rPr lang="en-US" altLang="en-US"/>
-              <a:t>Depend on unit tests from the start, Mockito is your friend</a:t>
-            </a:r>
-          </a:p>
-          <a:p>
-            <a:pPr lvl="1" eaLnBrk="1" hangingPunct="1"/>
-            <a:r>
-              <a:rPr lang="en-US" altLang="en-US"/>
-              <a:t>Identify logic problems as early as possible</a:t>
-            </a:r>
-          </a:p>
-          <a:p>
-            <a:pPr lvl="1" eaLnBrk="1" hangingPunct="1"/>
-            <a:r>
-              <a:rPr lang="en-US" altLang="en-US"/>
-              <a:t>Find a bug? Create a unit test!</a:t>
-            </a:r>
-          </a:p>
-          <a:p>
-            <a:pPr lvl="1" eaLnBrk="1" hangingPunct="1"/>
-            <a:endParaRPr lang="en-US" altLang="en-US"/>
-          </a:p>
-          <a:p>
-            <a:pPr lvl="1" eaLnBrk="1" hangingPunct="1"/>
-            <a:endParaRPr lang="en-US" altLang="en-US"/>
-          </a:p>
-          <a:p>
-            <a:pPr lvl="1" eaLnBrk="1" hangingPunct="1"/>
-            <a:endParaRPr lang="en-US" altLang="en-US"/>
-          </a:p>
-          <a:p>
-            <a:pPr lvl="1" eaLnBrk="1" hangingPunct="1"/>
-            <a:endParaRPr lang="en-US" altLang="en-US"/>
-          </a:p>
-          <a:p>
-            <a:pPr lvl="1" eaLnBrk="1" hangingPunct="1"/>
-            <a:endParaRPr lang="en-US" altLang="en-US"/>
-          </a:p>
-        </p:txBody>
-      </p:sp>
-      <p:pic>
-        <p:nvPicPr>
-          <p:cNvPr id="17412" name="Picture 1">
-            <a:extLst>
-              <a:ext uri="{FF2B5EF4-FFF2-40B4-BE49-F238E27FC236}">
-                <a16:creationId xmlns:a16="http://schemas.microsoft.com/office/drawing/2014/main" id="{31432DC9-1821-467B-9791-645CBC0D7477}"/>
-              </a:ext>
-            </a:extLst>
-          </p:cNvPr>
-          <p:cNvPicPr>
-            <a:picLocks noChangeAspect="1"/>
-          </p:cNvPicPr>
-          <p:nvPr/>
-        </p:nvPicPr>
-        <p:blipFill>
-          <a:blip r:embed="rId3">
-            <a:extLst>
-              <a:ext uri="{28A0092B-C50C-407E-A947-70E740481C1C}">
-                <a14:useLocalDpi xmlns:a14="http://schemas.microsoft.com/office/drawing/2010/main" val="0"/>
-              </a:ext>
-            </a:extLst>
-          </a:blip>
-          <a:srcRect/>
-          <a:stretch>
-            <a:fillRect/>
-          </a:stretch>
-        </p:blipFill>
-        <p:spPr bwMode="auto">
-          <a:xfrm>
-            <a:off x="2743200" y="2590800"/>
-            <a:ext cx="5829300" cy="3000375"/>
-          </a:xfrm>
-          <a:prstGeom prst="rect">
-            <a:avLst/>
-          </a:prstGeom>
-          <a:noFill/>
-          <a:ln>
-            <a:noFill/>
-          </a:ln>
-          <a:extLst>
-            <a:ext uri="{909E8E84-426E-40DD-AFC4-6F175D3DCCD1}">
-              <a14:hiddenFill xmlns:a14="http://schemas.microsoft.com/office/drawing/2010/main">
-                <a:solidFill>
-                  <a:srgbClr val="FFFFFF"/>
-                </a:solidFill>
-              </a14:hiddenFill>
-            </a:ext>
-            <a:ext uri="{91240B29-F687-4F45-9708-019B960494DF}">
-              <a14:hiddenLine xmlns:a14="http://schemas.microsoft.com/office/drawing/2010/main" w="9525">
-                <a:solidFill>
-                  <a:srgbClr val="000000"/>
-                </a:solidFill>
-                <a:miter lim="800000"/>
-                <a:headEnd/>
-                <a:tailEnd/>
-              </a14:hiddenLine>
-            </a:ext>
-          </a:extLst>
-        </p:spPr>
-      </p:pic>
+            <a:r>
+              <a:rPr lang="en-US" dirty="0"/>
+              <a:t>First, when your topology is started...</a:t>
+            </a:r>
+          </a:p>
+          <a:p>
+            <a:pPr lvl="1"/>
+            <a:r>
+              <a:rPr lang="en-US" dirty="0"/>
+              <a:t>Create Spouts and Bolts</a:t>
+            </a:r>
+          </a:p>
+          <a:p>
+            <a:pPr lvl="1"/>
+            <a:r>
+              <a:rPr lang="en-US" dirty="0" err="1"/>
+              <a:t>declareOutputFields</a:t>
+            </a:r>
+            <a:endParaRPr lang="en-US" dirty="0"/>
+          </a:p>
+          <a:p>
+            <a:pPr lvl="1"/>
+            <a:r>
+              <a:rPr lang="en-US" dirty="0"/>
+              <a:t>Spouts/Bolts serialized and assigned to workers</a:t>
+            </a:r>
+          </a:p>
+          <a:p>
+            <a:r>
+              <a:rPr lang="en-US" dirty="0"/>
+              <a:t>Second, in each worker somewhere on the cluster... </a:t>
+            </a:r>
+          </a:p>
+          <a:p>
+            <a:pPr lvl="1"/>
+            <a:r>
+              <a:rPr lang="en-US" dirty="0"/>
+              <a:t>Spouts open and Bolts prepare (happens once)</a:t>
+            </a:r>
+          </a:p>
+          <a:p>
+            <a:pPr lvl="1"/>
+            <a:r>
+              <a:rPr lang="en-US" dirty="0"/>
+              <a:t>In a loop...</a:t>
+            </a:r>
+          </a:p>
+          <a:p>
+            <a:pPr lvl="2"/>
+            <a:r>
+              <a:rPr lang="en-US" dirty="0"/>
+              <a:t>Spouts call ack, fail, and </a:t>
+            </a:r>
+            <a:r>
+              <a:rPr lang="en-US" dirty="0" err="1"/>
+              <a:t>nextTuple</a:t>
+            </a:r>
+            <a:endParaRPr lang="en-US" dirty="0"/>
+          </a:p>
+          <a:p>
+            <a:pPr lvl="2"/>
+            <a:r>
+              <a:rPr lang="en-US" dirty="0"/>
+              <a:t>Bolts call execute</a:t>
+            </a:r>
+          </a:p>
+          <a:p>
+            <a:endParaRPr lang="en-US" dirty="0"/>
+          </a:p>
+        </p:txBody>
+      </p:sp>
     </p:spTree>
+    <p:extLst>
+      <p:ext uri="{BB962C8B-B14F-4D97-AF65-F5344CB8AC3E}">
+        <p14:creationId xmlns:p14="http://schemas.microsoft.com/office/powerpoint/2010/main" val="1883065696"/>
+      </p:ext>
+    </p:extLst>
   </p:cSld>
   <p:clrMapOvr>
     <a:masterClrMapping/>

</xml_diff>